<commit_message>
Pow wait & sémaphore
</commit_message>
<xml_diff>
--- a/System/TP-PTC/TP producteur consommateur.pptx
+++ b/System/TP-PTC/TP producteur consommateur.pptx
@@ -109,6 +109,11 @@
       </a:defRPr>
     </a:lvl9pPr>
   </p:defaultTextStyle>
+  <p:extLst>
+    <p:ext uri="{EFAFB233-063F-42B5-8137-9DF3F51BA10A}">
+      <p15:sldGuideLst xmlns:p15="http://schemas.microsoft.com/office/powerpoint/2012/main"/>
+    </p:ext>
+  </p:extLst>
 </p:presentation>
 </file>
 
@@ -285,7 +290,7 @@
           <a:p>
             <a:fld id="{A052CE00-E623-4679-AA8D-45572365EEFC}" type="slidenum">
               <a:rPr lang="fr-FR" smtClean="0"/>
-              <a:t>‹N°›</a:t>
+              <a:t>‹#›</a:t>
             </a:fld>
             <a:endParaRPr lang="fr-FR"/>
           </a:p>
@@ -455,7 +460,7 @@
           <a:p>
             <a:fld id="{A052CE00-E623-4679-AA8D-45572365EEFC}" type="slidenum">
               <a:rPr lang="fr-FR" smtClean="0"/>
-              <a:t>‹N°›</a:t>
+              <a:t>‹#›</a:t>
             </a:fld>
             <a:endParaRPr lang="fr-FR"/>
           </a:p>
@@ -635,7 +640,7 @@
           <a:p>
             <a:fld id="{A052CE00-E623-4679-AA8D-45572365EEFC}" type="slidenum">
               <a:rPr lang="fr-FR" smtClean="0"/>
-              <a:t>‹N°›</a:t>
+              <a:t>‹#›</a:t>
             </a:fld>
             <a:endParaRPr lang="fr-FR"/>
           </a:p>
@@ -805,7 +810,7 @@
           <a:p>
             <a:fld id="{A052CE00-E623-4679-AA8D-45572365EEFC}" type="slidenum">
               <a:rPr lang="fr-FR" smtClean="0"/>
-              <a:t>‹N°›</a:t>
+              <a:t>‹#›</a:t>
             </a:fld>
             <a:endParaRPr lang="fr-FR"/>
           </a:p>
@@ -1051,7 +1056,7 @@
           <a:p>
             <a:fld id="{A052CE00-E623-4679-AA8D-45572365EEFC}" type="slidenum">
               <a:rPr lang="fr-FR" smtClean="0"/>
-              <a:t>‹N°›</a:t>
+              <a:t>‹#›</a:t>
             </a:fld>
             <a:endParaRPr lang="fr-FR"/>
           </a:p>
@@ -1283,7 +1288,7 @@
           <a:p>
             <a:fld id="{A052CE00-E623-4679-AA8D-45572365EEFC}" type="slidenum">
               <a:rPr lang="fr-FR" smtClean="0"/>
-              <a:t>‹N°›</a:t>
+              <a:t>‹#›</a:t>
             </a:fld>
             <a:endParaRPr lang="fr-FR"/>
           </a:p>
@@ -1650,7 +1655,7 @@
           <a:p>
             <a:fld id="{A052CE00-E623-4679-AA8D-45572365EEFC}" type="slidenum">
               <a:rPr lang="fr-FR" smtClean="0"/>
-              <a:t>‹N°›</a:t>
+              <a:t>‹#›</a:t>
             </a:fld>
             <a:endParaRPr lang="fr-FR"/>
           </a:p>
@@ -1768,7 +1773,7 @@
           <a:p>
             <a:fld id="{A052CE00-E623-4679-AA8D-45572365EEFC}" type="slidenum">
               <a:rPr lang="fr-FR" smtClean="0"/>
-              <a:t>‹N°›</a:t>
+              <a:t>‹#›</a:t>
             </a:fld>
             <a:endParaRPr lang="fr-FR"/>
           </a:p>
@@ -1863,7 +1868,7 @@
           <a:p>
             <a:fld id="{A052CE00-E623-4679-AA8D-45572365EEFC}" type="slidenum">
               <a:rPr lang="fr-FR" smtClean="0"/>
-              <a:t>‹N°›</a:t>
+              <a:t>‹#›</a:t>
             </a:fld>
             <a:endParaRPr lang="fr-FR"/>
           </a:p>
@@ -2140,7 +2145,7 @@
           <a:p>
             <a:fld id="{A052CE00-E623-4679-AA8D-45572365EEFC}" type="slidenum">
               <a:rPr lang="fr-FR" smtClean="0"/>
-              <a:t>‹N°›</a:t>
+              <a:t>‹#›</a:t>
             </a:fld>
             <a:endParaRPr lang="fr-FR"/>
           </a:p>
@@ -2393,7 +2398,7 @@
           <a:p>
             <a:fld id="{A052CE00-E623-4679-AA8D-45572365EEFC}" type="slidenum">
               <a:rPr lang="fr-FR" smtClean="0"/>
-              <a:t>‹N°›</a:t>
+              <a:t>‹#›</a:t>
             </a:fld>
             <a:endParaRPr lang="fr-FR"/>
           </a:p>
@@ -2642,7 +2647,7 @@
           <a:p>
             <a:fld id="{A052CE00-E623-4679-AA8D-45572365EEFC}" type="slidenum">
               <a:rPr lang="fr-FR" smtClean="0"/>
-              <a:t>‹N°›</a:t>
+              <a:t>‹#›</a:t>
             </a:fld>
             <a:endParaRPr lang="fr-FR"/>
           </a:p>
@@ -3305,6 +3310,35 @@
           <a:bodyPr/>
           <a:lstStyle/>
           <a:p>
+            <a:r>
+              <a:rPr lang="fr-FR" dirty="0" err="1" smtClean="0"/>
+              <a:t>Wait</a:t>
+            </a:r>
+            <a:r>
+              <a:rPr lang="fr-FR" dirty="0" smtClean="0"/>
+              <a:t> et </a:t>
+            </a:r>
+            <a:r>
+              <a:rPr lang="fr-FR" dirty="0" err="1" smtClean="0"/>
+              <a:t>notify</a:t>
+            </a:r>
+            <a:r>
+              <a:rPr lang="fr-FR" dirty="0" smtClean="0"/>
+              <a:t> : méthode synchronisée</a:t>
+            </a:r>
+          </a:p>
+          <a:p>
+            <a:endParaRPr lang="fr-FR" dirty="0"/>
+          </a:p>
+          <a:p>
+            <a:r>
+              <a:rPr lang="fr-FR" dirty="0" smtClean="0"/>
+              <a:t>Sémaphore : Chaque thread décrémente un type de sémaphore, et en incrémente </a:t>
+            </a:r>
+            <a:r>
+              <a:rPr lang="fr-FR" smtClean="0"/>
+              <a:t>un autre.</a:t>
+            </a:r>
             <a:endParaRPr lang="fr-FR" dirty="0"/>
           </a:p>
         </p:txBody>

</xml_diff>